<commit_message>
Added more info on solution for presentation
</commit_message>
<xml_diff>
--- a/Notes/TFM_presentations/2020_05_06/2020_05_06.pptx
+++ b/Notes/TFM_presentations/2020_05_06/2020_05_06.pptx
@@ -283,7 +283,7 @@
           <a:p>
             <a:fld id="{90B8881B-A1D3-4C57-8848-AF310D754CB8}" type="datetimeFigureOut">
               <a:rPr lang="en-GB" smtClean="0"/>
-              <a:t>05/05/2020</a:t>
+              <a:t>06/05/2020</a:t>
             </a:fld>
             <a:endParaRPr lang="en-GB"/>
           </a:p>
@@ -460,7 +460,7 @@
           <a:p>
             <a:fld id="{D07E13D9-DB12-424B-A0B8-3D2EDA86849F}" type="datetimeFigureOut">
               <a:rPr lang="en-GB" smtClean="0"/>
-              <a:t>05/05/2020</a:t>
+              <a:t>06/05/2020</a:t>
             </a:fld>
             <a:endParaRPr lang="en-GB" dirty="0"/>
           </a:p>
@@ -2274,7 +2274,7 @@
           <a:p>
             <a:fld id="{E38A22E1-EB92-4D54-BACA-04AA8A92E613}" type="datetime1">
               <a:rPr lang="en-GB" smtClean="0"/>
-              <a:t>05/05/2020</a:t>
+              <a:t>06/05/2020</a:t>
             </a:fld>
             <a:endParaRPr lang="en-GB" dirty="0"/>
           </a:p>
@@ -2491,7 +2491,7 @@
           <a:p>
             <a:fld id="{F7BBACEA-79DB-4B06-B53C-1515C6E9AA2A}" type="datetime1">
               <a:rPr lang="en-GB" smtClean="0"/>
-              <a:t>05/05/2020</a:t>
+              <a:t>06/05/2020</a:t>
             </a:fld>
             <a:endParaRPr lang="en-GB" dirty="0"/>
           </a:p>
@@ -2701,7 +2701,7 @@
           <a:p>
             <a:fld id="{1242A314-3A0B-49C4-ADB0-F8BBA4139E56}" type="datetime1">
               <a:rPr lang="en-GB" smtClean="0"/>
-              <a:t>05/05/2020</a:t>
+              <a:t>06/05/2020</a:t>
             </a:fld>
             <a:endParaRPr lang="en-GB" dirty="0"/>
           </a:p>
@@ -2901,7 +2901,7 @@
           <a:p>
             <a:fld id="{D240987B-0079-4EE9-8A70-14597C3743BC}" type="datetime1">
               <a:rPr lang="en-GB" smtClean="0"/>
-              <a:t>05/05/2020</a:t>
+              <a:t>06/05/2020</a:t>
             </a:fld>
             <a:endParaRPr lang="en-GB" dirty="0"/>
           </a:p>
@@ -3177,7 +3177,7 @@
           <a:p>
             <a:fld id="{9C436FE2-9B88-4810-AC3E-E01CD02C2930}" type="datetime1">
               <a:rPr lang="en-GB" smtClean="0"/>
-              <a:t>05/05/2020</a:t>
+              <a:t>06/05/2020</a:t>
             </a:fld>
             <a:endParaRPr lang="en-GB" dirty="0"/>
           </a:p>
@@ -3445,7 +3445,7 @@
           <a:p>
             <a:fld id="{08368621-535E-44A6-A126-3F2534EA9A7B}" type="datetime1">
               <a:rPr lang="en-GB" smtClean="0"/>
-              <a:t>05/05/2020</a:t>
+              <a:t>06/05/2020</a:t>
             </a:fld>
             <a:endParaRPr lang="en-GB" dirty="0"/>
           </a:p>
@@ -3860,7 +3860,7 @@
           <a:p>
             <a:fld id="{632F5B32-CFB7-415D-9B96-9BE2AE3D1AAC}" type="datetime1">
               <a:rPr lang="en-GB" smtClean="0"/>
-              <a:t>05/05/2020</a:t>
+              <a:t>06/05/2020</a:t>
             </a:fld>
             <a:endParaRPr lang="en-GB" dirty="0"/>
           </a:p>
@@ -4002,7 +4002,7 @@
           <a:p>
             <a:fld id="{C2A51E27-F50C-4FD5-A040-64C12EA57AB4}" type="datetime1">
               <a:rPr lang="en-GB" smtClean="0"/>
-              <a:t>05/05/2020</a:t>
+              <a:t>06/05/2020</a:t>
             </a:fld>
             <a:endParaRPr lang="en-GB" dirty="0"/>
           </a:p>
@@ -4115,7 +4115,7 @@
           <a:p>
             <a:fld id="{A60DBC3F-8614-44B4-9683-36A45BFFB7A1}" type="datetime1">
               <a:rPr lang="en-GB" smtClean="0"/>
-              <a:t>05/05/2020</a:t>
+              <a:t>06/05/2020</a:t>
             </a:fld>
             <a:endParaRPr lang="en-GB" dirty="0"/>
           </a:p>
@@ -4428,7 +4428,7 @@
           <a:p>
             <a:fld id="{23091C06-D056-41B0-9F5F-5E90B83401B6}" type="datetime1">
               <a:rPr lang="en-GB" smtClean="0"/>
-              <a:t>05/05/2020</a:t>
+              <a:t>06/05/2020</a:t>
             </a:fld>
             <a:endParaRPr lang="en-GB" dirty="0"/>
           </a:p>
@@ -4721,7 +4721,7 @@
           <a:p>
             <a:fld id="{119BFB93-9673-43A0-BDFE-39DE919D7FF9}" type="datetime1">
               <a:rPr lang="en-GB" smtClean="0"/>
-              <a:t>05/05/2020</a:t>
+              <a:t>06/05/2020</a:t>
             </a:fld>
             <a:endParaRPr lang="en-GB" dirty="0"/>
           </a:p>
@@ -5019,7 +5019,7 @@
             <a:fld id="{1D06A54C-354E-461C-AA7A-CD74CDD91362}" type="datetime1">
               <a:rPr lang="en-GB" smtClean="0"/>
               <a:pPr/>
-              <a:t>05/05/2020</a:t>
+              <a:t>06/05/2020</a:t>
             </a:fld>
             <a:endParaRPr lang="en-GB" dirty="0"/>
           </a:p>
@@ -14393,8 +14393,8 @@
           <a:chExt cx="0" cy="0"/>
         </a:xfrm>
       </p:grpSpPr>
-      <mc:AlternateContent xmlns:mc="http://schemas.openxmlformats.org/markup-compatibility/2006">
-        <mc:Choice xmlns:a14="http://schemas.microsoft.com/office/drawing/2010/main" Requires="a14">
+      <mc:AlternateContent xmlns:mc="http://schemas.openxmlformats.org/markup-compatibility/2006" xmlns:a14="http://schemas.microsoft.com/office/drawing/2010/main">
+        <mc:Choice Requires="a14">
           <p:sp>
             <p:nvSpPr>
               <p:cNvPr id="3" name="Content Placeholder 2">
@@ -15507,7 +15507,7 @@
             </p:txBody>
           </p:sp>
         </mc:Choice>
-        <mc:Fallback>
+        <mc:Fallback xmlns="">
           <p:sp>
             <p:nvSpPr>
               <p:cNvPr id="3" name="Content Placeholder 2">
@@ -15985,8 +15985,8 @@
           </p:sp>
         </mc:Fallback>
       </mc:AlternateContent>
-      <mc:AlternateContent xmlns:mc="http://schemas.openxmlformats.org/markup-compatibility/2006">
-        <mc:Choice xmlns:a14="http://schemas.microsoft.com/office/drawing/2010/main" Requires="a14">
+      <mc:AlternateContent xmlns:mc="http://schemas.openxmlformats.org/markup-compatibility/2006" xmlns:a14="http://schemas.microsoft.com/office/drawing/2010/main">
+        <mc:Choice Requires="a14">
           <p:sp>
             <p:nvSpPr>
               <p:cNvPr id="13" name="Content Placeholder 12">
@@ -16209,7 +16209,7 @@
             </p:txBody>
           </p:sp>
         </mc:Choice>
-        <mc:Fallback>
+        <mc:Fallback xmlns="">
           <p:sp>
             <p:nvSpPr>
               <p:cNvPr id="13" name="Content Placeholder 12">
@@ -16348,8 +16348,8 @@
           </a:prstGeom>
         </p:spPr>
       </p:pic>
-      <mc:AlternateContent xmlns:mc="http://schemas.openxmlformats.org/markup-compatibility/2006">
-        <mc:Choice xmlns:a14="http://schemas.microsoft.com/office/drawing/2010/main" Requires="a14">
+      <mc:AlternateContent xmlns:mc="http://schemas.openxmlformats.org/markup-compatibility/2006" xmlns:a14="http://schemas.microsoft.com/office/drawing/2010/main">
+        <mc:Choice Requires="a14">
           <p:sp>
             <p:nvSpPr>
               <p:cNvPr id="14" name="TextBox 13">
@@ -16378,6 +16378,7 @@
               </a:bodyPr>
               <a:lstStyle/>
               <a:p>
+                <a:pPr/>
                 <a14:m>
                   <m:oMathPara xmlns:m="http://schemas.openxmlformats.org/officeDocument/2006/math">
                     <m:oMathParaPr>
@@ -16445,7 +16446,7 @@
             </p:txBody>
           </p:sp>
         </mc:Choice>
-        <mc:Fallback>
+        <mc:Fallback xmlns="">
           <p:sp>
             <p:nvSpPr>
               <p:cNvPr id="14" name="TextBox 13">
@@ -16680,8 +16681,8 @@
           </p:sp>
         </mc:Fallback>
       </mc:AlternateContent>
-      <mc:AlternateContent xmlns:mc="http://schemas.openxmlformats.org/markup-compatibility/2006">
-        <mc:Choice xmlns:a14="http://schemas.microsoft.com/office/drawing/2010/main" Requires="a14">
+      <mc:AlternateContent xmlns:mc="http://schemas.openxmlformats.org/markup-compatibility/2006" xmlns:a14="http://schemas.microsoft.com/office/drawing/2010/main">
+        <mc:Choice Requires="a14">
           <p:sp>
             <p:nvSpPr>
               <p:cNvPr id="13" name="Content Placeholder 12">
@@ -16904,7 +16905,7 @@
             </p:txBody>
           </p:sp>
         </mc:Choice>
-        <mc:Fallback>
+        <mc:Fallback xmlns="">
           <p:sp>
             <p:nvSpPr>
               <p:cNvPr id="13" name="Content Placeholder 12">
@@ -17043,8 +17044,8 @@
           </a:prstGeom>
         </p:spPr>
       </p:pic>
-      <mc:AlternateContent xmlns:mc="http://schemas.openxmlformats.org/markup-compatibility/2006">
-        <mc:Choice xmlns:a14="http://schemas.microsoft.com/office/drawing/2010/main" Requires="a14">
+      <mc:AlternateContent xmlns:mc="http://schemas.openxmlformats.org/markup-compatibility/2006" xmlns:a14="http://schemas.microsoft.com/office/drawing/2010/main">
+        <mc:Choice Requires="a14">
           <p:sp>
             <p:nvSpPr>
               <p:cNvPr id="14" name="TextBox 13">
@@ -17073,6 +17074,7 @@
               </a:bodyPr>
               <a:lstStyle/>
               <a:p>
+                <a:pPr/>
                 <a14:m>
                   <m:oMathPara xmlns:m="http://schemas.openxmlformats.org/officeDocument/2006/math">
                     <m:oMathParaPr>
@@ -17140,7 +17142,7 @@
             </p:txBody>
           </p:sp>
         </mc:Choice>
-        <mc:Fallback>
+        <mc:Fallback xmlns="">
           <p:sp>
             <p:nvSpPr>
               <p:cNvPr id="14" name="TextBox 13">
@@ -17375,8 +17377,8 @@
           </p:sp>
         </mc:Fallback>
       </mc:AlternateContent>
-      <mc:AlternateContent xmlns:mc="http://schemas.openxmlformats.org/markup-compatibility/2006">
-        <mc:Choice xmlns:a14="http://schemas.microsoft.com/office/drawing/2010/main" Requires="a14">
+      <mc:AlternateContent xmlns:mc="http://schemas.openxmlformats.org/markup-compatibility/2006" xmlns:a14="http://schemas.microsoft.com/office/drawing/2010/main">
+        <mc:Choice Requires="a14">
           <p:sp>
             <p:nvSpPr>
               <p:cNvPr id="13" name="Content Placeholder 12">
@@ -17599,7 +17601,7 @@
             </p:txBody>
           </p:sp>
         </mc:Choice>
-        <mc:Fallback>
+        <mc:Fallback xmlns="">
           <p:sp>
             <p:nvSpPr>
               <p:cNvPr id="13" name="Content Placeholder 12">
@@ -17738,8 +17740,8 @@
           </a:prstGeom>
         </p:spPr>
       </p:pic>
-      <mc:AlternateContent xmlns:mc="http://schemas.openxmlformats.org/markup-compatibility/2006">
-        <mc:Choice xmlns:a14="http://schemas.microsoft.com/office/drawing/2010/main" Requires="a14">
+      <mc:AlternateContent xmlns:mc="http://schemas.openxmlformats.org/markup-compatibility/2006" xmlns:a14="http://schemas.microsoft.com/office/drawing/2010/main">
+        <mc:Choice Requires="a14">
           <p:sp>
             <p:nvSpPr>
               <p:cNvPr id="14" name="TextBox 13">
@@ -17768,6 +17770,7 @@
               </a:bodyPr>
               <a:lstStyle/>
               <a:p>
+                <a:pPr/>
                 <a14:m>
                   <m:oMathPara xmlns:m="http://schemas.openxmlformats.org/officeDocument/2006/math">
                     <m:oMathParaPr>
@@ -17835,7 +17838,7 @@
             </p:txBody>
           </p:sp>
         </mc:Choice>
-        <mc:Fallback>
+        <mc:Fallback xmlns="">
           <p:sp>
             <p:nvSpPr>
               <p:cNvPr id="14" name="TextBox 13">
@@ -18043,8 +18046,8 @@
         </p:blipFill>
         <p:spPr>
           <a:xfrm>
-            <a:off x="838200" y="1248980"/>
-            <a:ext cx="5181600" cy="3071726"/>
+            <a:off x="1260763" y="1499481"/>
+            <a:ext cx="4336474" cy="2570724"/>
           </a:xfrm>
         </p:spPr>
       </p:pic>
@@ -18078,8 +18081,8 @@
         </p:blipFill>
         <p:spPr>
           <a:xfrm>
-            <a:off x="6172200" y="1248980"/>
-            <a:ext cx="5181600" cy="3071726"/>
+            <a:off x="6594763" y="1499481"/>
+            <a:ext cx="4336474" cy="2570724"/>
           </a:xfrm>
         </p:spPr>
       </p:pic>
@@ -18415,7 +18418,7 @@
             </p:nvSpPr>
             <p:spPr>
               <a:xfrm>
-                <a:off x="1735401" y="4601221"/>
+                <a:off x="838200" y="4092001"/>
                 <a:ext cx="2190471" cy="1495218"/>
               </a:xfrm>
               <a:prstGeom prst="rect">
@@ -18674,7 +18677,7 @@
             </p:nvSpPr>
             <p:spPr>
               <a:xfrm>
-                <a:off x="1735401" y="4601221"/>
+                <a:off x="838200" y="4092001"/>
                 <a:ext cx="2190471" cy="1495218"/>
               </a:xfrm>
               <a:prstGeom prst="rect">
@@ -18718,7 +18721,7 @@
             </p:nvSpPr>
             <p:spPr>
               <a:xfrm>
-                <a:off x="4111642" y="4601221"/>
+                <a:off x="3214441" y="4092001"/>
                 <a:ext cx="2206373" cy="1495218"/>
               </a:xfrm>
               <a:prstGeom prst="rect">
@@ -18974,7 +18977,7 @@
             </p:nvSpPr>
             <p:spPr>
               <a:xfrm>
-                <a:off x="4111642" y="4601221"/>
+                <a:off x="3214441" y="4092001"/>
                 <a:ext cx="2206373" cy="1495218"/>
               </a:xfrm>
               <a:prstGeom prst="rect">
@@ -18982,6 +18985,657 @@
               </a:prstGeom>
               <a:blipFill>
                 <a:blip r:embed="rId13"/>
+                <a:stretch>
+                  <a:fillRect/>
+                </a:stretch>
+              </a:blipFill>
+            </p:spPr>
+            <p:txBody>
+              <a:bodyPr/>
+              <a:lstStyle/>
+              <a:p>
+                <a:r>
+                  <a:rPr lang="en-GB">
+                    <a:noFill/>
+                  </a:rPr>
+                  <a:t> </a:t>
+                </a:r>
+              </a:p>
+            </p:txBody>
+          </p:sp>
+        </mc:Fallback>
+      </mc:AlternateContent>
+      <mc:AlternateContent xmlns:mc="http://schemas.openxmlformats.org/markup-compatibility/2006">
+        <mc:Choice xmlns:a14="http://schemas.microsoft.com/office/drawing/2010/main" Requires="a14">
+          <p:sp>
+            <p:nvSpPr>
+              <p:cNvPr id="17" name="Rectangle 16">
+                <a:extLst>
+                  <a:ext uri="{FF2B5EF4-FFF2-40B4-BE49-F238E27FC236}">
+                    <a16:creationId xmlns:a16="http://schemas.microsoft.com/office/drawing/2014/main" id="{806315B3-3B34-4261-86AD-2D0CA4905DB4}"/>
+                  </a:ext>
+                </a:extLst>
+              </p:cNvPr>
+              <p:cNvSpPr/>
+              <p:nvPr/>
+            </p:nvSpPr>
+            <p:spPr>
+              <a:xfrm>
+                <a:off x="5420814" y="4092001"/>
+                <a:ext cx="2716834" cy="1495218"/>
+              </a:xfrm>
+              <a:prstGeom prst="rect">
+                <a:avLst/>
+              </a:prstGeom>
+            </p:spPr>
+            <p:txBody>
+              <a:bodyPr wrap="none">
+                <a:spAutoFit/>
+              </a:bodyPr>
+              <a:lstStyle/>
+              <a:p>
+                <a:pPr/>
+                <a14:m>
+                  <m:oMathPara xmlns:m="http://schemas.openxmlformats.org/officeDocument/2006/math">
+                    <m:oMathParaPr>
+                      <m:jc m:val="left"/>
+                    </m:oMathParaPr>
+                    <m:oMath xmlns:m="http://schemas.openxmlformats.org/officeDocument/2006/math">
+                      <m:r>
+                        <a:rPr lang="en-GB" i="1" smtClean="0">
+                          <a:latin typeface="Cambria Math" panose="02040503050406030204" pitchFamily="18" charset="0"/>
+                        </a:rPr>
+                        <m:t>𝐴</m:t>
+                      </m:r>
+                      <m:d>
+                        <m:dPr>
+                          <m:ctrlPr>
+                            <a:rPr lang="en-GB" b="0" i="1" smtClean="0">
+                              <a:latin typeface="Cambria Math" panose="02040503050406030204" pitchFamily="18" charset="0"/>
+                            </a:rPr>
+                          </m:ctrlPr>
+                        </m:dPr>
+                        <m:e>
+                          <m:sSub>
+                            <m:sSubPr>
+                              <m:ctrlPr>
+                                <a:rPr lang="en-GB" b="0" i="1" smtClean="0">
+                                  <a:latin typeface="Cambria Math" panose="02040503050406030204" pitchFamily="18" charset="0"/>
+                                </a:rPr>
+                              </m:ctrlPr>
+                            </m:sSubPr>
+                            <m:e>
+                              <m:r>
+                                <a:rPr lang="en-GB" b="0" i="1" smtClean="0">
+                                  <a:latin typeface="Cambria Math" panose="02040503050406030204" pitchFamily="18" charset="0"/>
+                                </a:rPr>
+                                <m:t>𝑣</m:t>
+                              </m:r>
+                            </m:e>
+                            <m:sub>
+                              <m:r>
+                                <a:rPr lang="en-GB" b="0" i="1" smtClean="0">
+                                  <a:latin typeface="Cambria Math" panose="02040503050406030204" pitchFamily="18" charset="0"/>
+                                </a:rPr>
+                                <m:t>𝐴</m:t>
+                              </m:r>
+                            </m:sub>
+                          </m:sSub>
+                          <m:r>
+                            <a:rPr lang="en-GB" b="0" i="1" smtClean="0">
+                              <a:latin typeface="Cambria Math" panose="02040503050406030204" pitchFamily="18" charset="0"/>
+                            </a:rPr>
+                            <m:t>+</m:t>
+                          </m:r>
+                          <m:sSub>
+                            <m:sSubPr>
+                              <m:ctrlPr>
+                                <a:rPr lang="en-GB" b="0" i="1" smtClean="0">
+                                  <a:latin typeface="Cambria Math" panose="02040503050406030204" pitchFamily="18" charset="0"/>
+                                </a:rPr>
+                              </m:ctrlPr>
+                            </m:sSubPr>
+                            <m:e>
+                              <m:r>
+                                <a:rPr lang="en-GB" b="0" i="1" smtClean="0">
+                                  <a:latin typeface="Cambria Math" panose="02040503050406030204" pitchFamily="18" charset="0"/>
+                                </a:rPr>
+                                <m:t>𝑣</m:t>
+                              </m:r>
+                            </m:e>
+                            <m:sub>
+                              <m:r>
+                                <a:rPr lang="en-GB" b="0" i="1" smtClean="0">
+                                  <a:latin typeface="Cambria Math" panose="02040503050406030204" pitchFamily="18" charset="0"/>
+                                </a:rPr>
+                                <m:t>𝐵</m:t>
+                              </m:r>
+                            </m:sub>
+                          </m:sSub>
+                        </m:e>
+                      </m:d>
+                      <m:r>
+                        <a:rPr lang="en-GB" i="1">
+                          <a:latin typeface="Cambria Math" panose="02040503050406030204" pitchFamily="18" charset="0"/>
+                        </a:rPr>
+                        <m:t>=</m:t>
+                      </m:r>
+                      <m:d>
+                        <m:dPr>
+                          <m:begChr m:val="{"/>
+                          <m:endChr m:val="}"/>
+                          <m:ctrlPr>
+                            <a:rPr lang="en-GB" i="1">
+                              <a:latin typeface="Cambria Math" panose="02040503050406030204" pitchFamily="18" charset="0"/>
+                            </a:rPr>
+                          </m:ctrlPr>
+                        </m:dPr>
+                        <m:e>
+                          <m:m>
+                            <m:mPr>
+                              <m:mcs>
+                                <m:mc>
+                                  <m:mcPr>
+                                    <m:count m:val="1"/>
+                                    <m:mcJc m:val="center"/>
+                                  </m:mcPr>
+                                </m:mc>
+                              </m:mcs>
+                              <m:ctrlPr>
+                                <a:rPr lang="en-GB" i="1">
+                                  <a:latin typeface="Cambria Math" panose="02040503050406030204" pitchFamily="18" charset="0"/>
+                                </a:rPr>
+                              </m:ctrlPr>
+                            </m:mPr>
+                            <m:mr>
+                              <m:e>
+                                <m:d>
+                                  <m:dPr>
+                                    <m:begChr m:val="["/>
+                                    <m:endChr m:val="]"/>
+                                    <m:ctrlPr>
+                                      <a:rPr lang="en-GB" i="1">
+                                        <a:latin typeface="Cambria Math" panose="02040503050406030204" pitchFamily="18" charset="0"/>
+                                      </a:rPr>
+                                    </m:ctrlPr>
+                                  </m:dPr>
+                                  <m:e>
+                                    <m:r>
+                                      <m:rPr>
+                                        <m:brk m:alnAt="7"/>
+                                      </m:rPr>
+                                      <a:rPr lang="en-GB" i="1">
+                                        <a:latin typeface="Cambria Math" panose="02040503050406030204" pitchFamily="18" charset="0"/>
+                                      </a:rPr>
+                                      <m:t>5</m:t>
+                                    </m:r>
+                                    <m:r>
+                                      <a:rPr lang="en-GB" i="1">
+                                        <a:latin typeface="Cambria Math" panose="02040503050406030204" pitchFamily="18" charset="0"/>
+                                      </a:rPr>
+                                      <m:t>, 15</m:t>
+                                    </m:r>
+                                  </m:e>
+                                </m:d>
+                              </m:e>
+                            </m:mr>
+                            <m:mr>
+                              <m:e>
+                                <m:d>
+                                  <m:dPr>
+                                    <m:begChr m:val="["/>
+                                    <m:endChr m:val="]"/>
+                                    <m:ctrlPr>
+                                      <a:rPr lang="en-GB" i="1">
+                                        <a:latin typeface="Cambria Math" panose="02040503050406030204" pitchFamily="18" charset="0"/>
+                                      </a:rPr>
+                                    </m:ctrlPr>
+                                  </m:dPr>
+                                  <m:e>
+                                    <m:r>
+                                      <a:rPr lang="en-GB" i="1">
+                                        <a:latin typeface="Cambria Math" panose="02040503050406030204" pitchFamily="18" charset="0"/>
+                                      </a:rPr>
+                                      <m:t>5, 15</m:t>
+                                    </m:r>
+                                  </m:e>
+                                </m:d>
+                              </m:e>
+                            </m:mr>
+                            <m:mr>
+                              <m:e>
+                                <m:d>
+                                  <m:dPr>
+                                    <m:begChr m:val="["/>
+                                    <m:endChr m:val="]"/>
+                                    <m:ctrlPr>
+                                      <a:rPr lang="en-GB" i="1">
+                                        <a:latin typeface="Cambria Math" panose="02040503050406030204" pitchFamily="18" charset="0"/>
+                                      </a:rPr>
+                                    </m:ctrlPr>
+                                  </m:dPr>
+                                  <m:e>
+                                    <m:r>
+                                      <m:rPr>
+                                        <m:brk m:alnAt="7"/>
+                                      </m:rPr>
+                                      <a:rPr lang="en-GB" i="1">
+                                        <a:latin typeface="Cambria Math" panose="02040503050406030204" pitchFamily="18" charset="0"/>
+                                      </a:rPr>
+                                      <m:t>5</m:t>
+                                    </m:r>
+                                    <m:r>
+                                      <a:rPr lang="en-GB" i="1">
+                                        <a:latin typeface="Cambria Math" panose="02040503050406030204" pitchFamily="18" charset="0"/>
+                                      </a:rPr>
+                                      <m:t>, </m:t>
+                                    </m:r>
+                                    <m:r>
+                                      <a:rPr lang="en-GB" b="0" i="1" smtClean="0">
+                                        <a:latin typeface="Cambria Math" panose="02040503050406030204" pitchFamily="18" charset="0"/>
+                                      </a:rPr>
+                                      <m:t>20</m:t>
+                                    </m:r>
+                                  </m:e>
+                                </m:d>
+                              </m:e>
+                            </m:mr>
+                            <m:mr>
+                              <m:e>
+                                <m:d>
+                                  <m:dPr>
+                                    <m:begChr m:val="["/>
+                                    <m:endChr m:val="]"/>
+                                    <m:ctrlPr>
+                                      <a:rPr lang="en-GB" i="1">
+                                        <a:latin typeface="Cambria Math" panose="02040503050406030204" pitchFamily="18" charset="0"/>
+                                      </a:rPr>
+                                    </m:ctrlPr>
+                                  </m:dPr>
+                                  <m:e>
+                                    <m:r>
+                                      <a:rPr lang="en-GB" i="1">
+                                        <a:latin typeface="Cambria Math" panose="02040503050406030204" pitchFamily="18" charset="0"/>
+                                      </a:rPr>
+                                      <m:t>10, 20</m:t>
+                                    </m:r>
+                                  </m:e>
+                                </m:d>
+                              </m:e>
+                            </m:mr>
+                            <m:mr>
+                              <m:e>
+                                <m:d>
+                                  <m:dPr>
+                                    <m:begChr m:val="["/>
+                                    <m:endChr m:val="]"/>
+                                    <m:ctrlPr>
+                                      <a:rPr lang="en-GB" b="0" i="1" smtClean="0">
+                                        <a:latin typeface="Cambria Math" panose="02040503050406030204" pitchFamily="18" charset="0"/>
+                                      </a:rPr>
+                                    </m:ctrlPr>
+                                  </m:dPr>
+                                  <m:e>
+                                    <m:r>
+                                      <a:rPr lang="en-GB" b="0" i="1" smtClean="0">
+                                        <a:latin typeface="Cambria Math" panose="02040503050406030204" pitchFamily="18" charset="0"/>
+                                      </a:rPr>
+                                      <m:t>10, 20</m:t>
+                                    </m:r>
+                                  </m:e>
+                                </m:d>
+                              </m:e>
+                            </m:mr>
+                          </m:m>
+                        </m:e>
+                      </m:d>
+                    </m:oMath>
+                  </m:oMathPara>
+                </a14:m>
+                <a:endParaRPr lang="en-GB" dirty="0"/>
+              </a:p>
+            </p:txBody>
+          </p:sp>
+        </mc:Choice>
+        <mc:Fallback>
+          <p:sp>
+            <p:nvSpPr>
+              <p:cNvPr id="17" name="Rectangle 16">
+                <a:extLst>
+                  <a:ext uri="{FF2B5EF4-FFF2-40B4-BE49-F238E27FC236}">
+                    <a16:creationId xmlns:a16="http://schemas.microsoft.com/office/drawing/2014/main" id="{806315B3-3B34-4261-86AD-2D0CA4905DB4}"/>
+                  </a:ext>
+                </a:extLst>
+              </p:cNvPr>
+              <p:cNvSpPr>
+                <a:spLocks noRot="1" noChangeAspect="1" noMove="1" noResize="1" noEditPoints="1" noAdjustHandles="1" noChangeArrowheads="1" noChangeShapeType="1" noTextEdit="1"/>
+              </p:cNvSpPr>
+              <p:nvPr/>
+            </p:nvSpPr>
+            <p:spPr>
+              <a:xfrm>
+                <a:off x="5420814" y="4092001"/>
+                <a:ext cx="2716834" cy="1495218"/>
+              </a:xfrm>
+              <a:prstGeom prst="rect">
+                <a:avLst/>
+              </a:prstGeom>
+              <a:blipFill>
+                <a:blip r:embed="rId14"/>
+                <a:stretch>
+                  <a:fillRect/>
+                </a:stretch>
+              </a:blipFill>
+            </p:spPr>
+            <p:txBody>
+              <a:bodyPr/>
+              <a:lstStyle/>
+              <a:p>
+                <a:r>
+                  <a:rPr lang="en-GB">
+                    <a:noFill/>
+                  </a:rPr>
+                  <a:t> </a:t>
+                </a:r>
+              </a:p>
+            </p:txBody>
+          </p:sp>
+        </mc:Fallback>
+      </mc:AlternateContent>
+      <mc:AlternateContent xmlns:mc="http://schemas.openxmlformats.org/markup-compatibility/2006">
+        <mc:Choice xmlns:a14="http://schemas.microsoft.com/office/drawing/2010/main" Requires="a14">
+          <p:sp>
+            <p:nvSpPr>
+              <p:cNvPr id="3" name="TextBox 2">
+                <a:extLst>
+                  <a:ext uri="{FF2B5EF4-FFF2-40B4-BE49-F238E27FC236}">
+                    <a16:creationId xmlns:a16="http://schemas.microsoft.com/office/drawing/2014/main" id="{F0A0968D-4E7F-4E6D-9579-E978D111B0D1}"/>
+                  </a:ext>
+                </a:extLst>
+              </p:cNvPr>
+              <p:cNvSpPr txBox="1"/>
+              <p:nvPr/>
+            </p:nvSpPr>
+            <p:spPr>
+              <a:xfrm>
+                <a:off x="838200" y="5630286"/>
+                <a:ext cx="2057632" cy="369332"/>
+              </a:xfrm>
+              <a:prstGeom prst="rect">
+                <a:avLst/>
+              </a:prstGeom>
+              <a:noFill/>
+            </p:spPr>
+            <p:txBody>
+              <a:bodyPr wrap="square" rtlCol="0">
+                <a:spAutoFit/>
+              </a:bodyPr>
+              <a:lstStyle/>
+              <a:p>
+                <a:pPr/>
+                <a14:m>
+                  <m:oMathPara xmlns:m="http://schemas.openxmlformats.org/officeDocument/2006/math">
+                    <m:oMathParaPr>
+                      <m:jc m:val="left"/>
+                    </m:oMathParaPr>
+                    <m:oMath xmlns:m="http://schemas.openxmlformats.org/officeDocument/2006/math">
+                      <m:r>
+                        <a:rPr lang="en-GB" b="0" i="1" smtClean="0">
+                          <a:latin typeface="Cambria Math" panose="02040503050406030204" pitchFamily="18" charset="0"/>
+                        </a:rPr>
+                        <m:t>𝑀</m:t>
+                      </m:r>
+                      <m:d>
+                        <m:dPr>
+                          <m:ctrlPr>
+                            <a:rPr lang="en-GB" b="0" i="1" smtClean="0">
+                              <a:latin typeface="Cambria Math" panose="02040503050406030204" pitchFamily="18" charset="0"/>
+                            </a:rPr>
+                          </m:ctrlPr>
+                        </m:dPr>
+                        <m:e>
+                          <m:sSub>
+                            <m:sSubPr>
+                              <m:ctrlPr>
+                                <a:rPr lang="en-GB" b="0" i="1" smtClean="0">
+                                  <a:latin typeface="Cambria Math" panose="02040503050406030204" pitchFamily="18" charset="0"/>
+                                </a:rPr>
+                              </m:ctrlPr>
+                            </m:sSubPr>
+                            <m:e>
+                              <m:r>
+                                <a:rPr lang="en-GB" b="0" i="1" smtClean="0">
+                                  <a:latin typeface="Cambria Math" panose="02040503050406030204" pitchFamily="18" charset="0"/>
+                                </a:rPr>
+                                <m:t>𝑣</m:t>
+                              </m:r>
+                            </m:e>
+                            <m:sub>
+                              <m:r>
+                                <a:rPr lang="en-GB" b="0" i="1" smtClean="0">
+                                  <a:latin typeface="Cambria Math" panose="02040503050406030204" pitchFamily="18" charset="0"/>
+                                </a:rPr>
+                                <m:t>𝐴</m:t>
+                              </m:r>
+                            </m:sub>
+                          </m:sSub>
+                        </m:e>
+                      </m:d>
+                      <m:r>
+                        <a:rPr lang="en-GB" b="0" i="1" smtClean="0">
+                          <a:latin typeface="Cambria Math" panose="02040503050406030204" pitchFamily="18" charset="0"/>
+                        </a:rPr>
+                        <m:t>=</m:t>
+                      </m:r>
+                      <m:d>
+                        <m:dPr>
+                          <m:begChr m:val="{"/>
+                          <m:endChr m:val="}"/>
+                          <m:ctrlPr>
+                            <a:rPr lang="en-GB" b="0" i="1" smtClean="0">
+                              <a:latin typeface="Cambria Math" panose="02040503050406030204" pitchFamily="18" charset="0"/>
+                            </a:rPr>
+                          </m:ctrlPr>
+                        </m:dPr>
+                        <m:e>
+                          <m:r>
+                            <a:rPr lang="en-GB" b="0" i="1" smtClean="0">
+                              <a:latin typeface="Cambria Math" panose="02040503050406030204" pitchFamily="18" charset="0"/>
+                            </a:rPr>
+                            <m:t>2, 3</m:t>
+                          </m:r>
+                        </m:e>
+                      </m:d>
+                    </m:oMath>
+                  </m:oMathPara>
+                </a14:m>
+                <a:endParaRPr lang="en-GB" dirty="0"/>
+              </a:p>
+            </p:txBody>
+          </p:sp>
+        </mc:Choice>
+        <mc:Fallback>
+          <p:sp>
+            <p:nvSpPr>
+              <p:cNvPr id="3" name="TextBox 2">
+                <a:extLst>
+                  <a:ext uri="{FF2B5EF4-FFF2-40B4-BE49-F238E27FC236}">
+                    <a16:creationId xmlns:a16="http://schemas.microsoft.com/office/drawing/2014/main" id="{F0A0968D-4E7F-4E6D-9579-E978D111B0D1}"/>
+                  </a:ext>
+                </a:extLst>
+              </p:cNvPr>
+              <p:cNvSpPr txBox="1">
+                <a:spLocks noRot="1" noChangeAspect="1" noMove="1" noResize="1" noEditPoints="1" noAdjustHandles="1" noChangeArrowheads="1" noChangeShapeType="1" noTextEdit="1"/>
+              </p:cNvSpPr>
+              <p:nvPr/>
+            </p:nvSpPr>
+            <p:spPr>
+              <a:xfrm>
+                <a:off x="838200" y="5630286"/>
+                <a:ext cx="2057632" cy="369332"/>
+              </a:xfrm>
+              <a:prstGeom prst="rect">
+                <a:avLst/>
+              </a:prstGeom>
+              <a:blipFill>
+                <a:blip r:embed="rId15"/>
+                <a:stretch>
+                  <a:fillRect/>
+                </a:stretch>
+              </a:blipFill>
+            </p:spPr>
+            <p:txBody>
+              <a:bodyPr/>
+              <a:lstStyle/>
+              <a:p>
+                <a:r>
+                  <a:rPr lang="en-GB">
+                    <a:noFill/>
+                  </a:rPr>
+                  <a:t> </a:t>
+                </a:r>
+              </a:p>
+            </p:txBody>
+          </p:sp>
+        </mc:Fallback>
+      </mc:AlternateContent>
+      <mc:AlternateContent xmlns:mc="http://schemas.openxmlformats.org/markup-compatibility/2006">
+        <mc:Choice xmlns:a14="http://schemas.microsoft.com/office/drawing/2010/main" Requires="a14">
+          <p:sp>
+            <p:nvSpPr>
+              <p:cNvPr id="19" name="TextBox 18">
+                <a:extLst>
+                  <a:ext uri="{FF2B5EF4-FFF2-40B4-BE49-F238E27FC236}">
+                    <a16:creationId xmlns:a16="http://schemas.microsoft.com/office/drawing/2014/main" id="{C55C7EAB-C52E-48E3-8F4B-8574DD8202B9}"/>
+                  </a:ext>
+                </a:extLst>
+              </p:cNvPr>
+              <p:cNvSpPr txBox="1"/>
+              <p:nvPr/>
+            </p:nvSpPr>
+            <p:spPr>
+              <a:xfrm>
+                <a:off x="3214441" y="5632180"/>
+                <a:ext cx="2057632" cy="369332"/>
+              </a:xfrm>
+              <a:prstGeom prst="rect">
+                <a:avLst/>
+              </a:prstGeom>
+              <a:noFill/>
+            </p:spPr>
+            <p:txBody>
+              <a:bodyPr wrap="square" rtlCol="0">
+                <a:spAutoFit/>
+              </a:bodyPr>
+              <a:lstStyle/>
+              <a:p>
+                <a:pPr/>
+                <a14:m>
+                  <m:oMathPara xmlns:m="http://schemas.openxmlformats.org/officeDocument/2006/math">
+                    <m:oMathParaPr>
+                      <m:jc m:val="left"/>
+                    </m:oMathParaPr>
+                    <m:oMath xmlns:m="http://schemas.openxmlformats.org/officeDocument/2006/math">
+                      <m:r>
+                        <a:rPr lang="en-GB" b="0" i="1" smtClean="0">
+                          <a:latin typeface="Cambria Math" panose="02040503050406030204" pitchFamily="18" charset="0"/>
+                        </a:rPr>
+                        <m:t>𝑀</m:t>
+                      </m:r>
+                      <m:d>
+                        <m:dPr>
+                          <m:ctrlPr>
+                            <a:rPr lang="en-GB" b="0" i="1" smtClean="0">
+                              <a:latin typeface="Cambria Math" panose="02040503050406030204" pitchFamily="18" charset="0"/>
+                            </a:rPr>
+                          </m:ctrlPr>
+                        </m:dPr>
+                        <m:e>
+                          <m:sSub>
+                            <m:sSubPr>
+                              <m:ctrlPr>
+                                <a:rPr lang="en-GB" b="0" i="1" smtClean="0">
+                                  <a:latin typeface="Cambria Math" panose="02040503050406030204" pitchFamily="18" charset="0"/>
+                                </a:rPr>
+                              </m:ctrlPr>
+                            </m:sSubPr>
+                            <m:e>
+                              <m:r>
+                                <a:rPr lang="en-GB" b="0" i="1" smtClean="0">
+                                  <a:latin typeface="Cambria Math" panose="02040503050406030204" pitchFamily="18" charset="0"/>
+                                </a:rPr>
+                                <m:t>𝑣</m:t>
+                              </m:r>
+                            </m:e>
+                            <m:sub>
+                              <m:r>
+                                <a:rPr lang="en-GB" b="0" i="1" smtClean="0">
+                                  <a:latin typeface="Cambria Math" panose="02040503050406030204" pitchFamily="18" charset="0"/>
+                                </a:rPr>
+                                <m:t>𝐴</m:t>
+                              </m:r>
+                            </m:sub>
+                          </m:sSub>
+                        </m:e>
+                      </m:d>
+                      <m:r>
+                        <a:rPr lang="en-GB" b="0" i="1" smtClean="0">
+                          <a:latin typeface="Cambria Math" panose="02040503050406030204" pitchFamily="18" charset="0"/>
+                        </a:rPr>
+                        <m:t>=</m:t>
+                      </m:r>
+                      <m:d>
+                        <m:dPr>
+                          <m:begChr m:val="{"/>
+                          <m:endChr m:val="}"/>
+                          <m:ctrlPr>
+                            <a:rPr lang="en-GB" b="0" i="1" smtClean="0">
+                              <a:latin typeface="Cambria Math" panose="02040503050406030204" pitchFamily="18" charset="0"/>
+                            </a:rPr>
+                          </m:ctrlPr>
+                        </m:dPr>
+                        <m:e>
+                          <m:r>
+                            <a:rPr lang="en-GB" b="0" i="1" smtClean="0">
+                              <a:latin typeface="Cambria Math" panose="02040503050406030204" pitchFamily="18" charset="0"/>
+                            </a:rPr>
+                            <m:t>3, 2</m:t>
+                          </m:r>
+                        </m:e>
+                      </m:d>
+                    </m:oMath>
+                  </m:oMathPara>
+                </a14:m>
+                <a:endParaRPr lang="en-GB" dirty="0"/>
+              </a:p>
+            </p:txBody>
+          </p:sp>
+        </mc:Choice>
+        <mc:Fallback>
+          <p:sp>
+            <p:nvSpPr>
+              <p:cNvPr id="19" name="TextBox 18">
+                <a:extLst>
+                  <a:ext uri="{FF2B5EF4-FFF2-40B4-BE49-F238E27FC236}">
+                    <a16:creationId xmlns:a16="http://schemas.microsoft.com/office/drawing/2014/main" id="{C55C7EAB-C52E-48E3-8F4B-8574DD8202B9}"/>
+                  </a:ext>
+                </a:extLst>
+              </p:cNvPr>
+              <p:cNvSpPr txBox="1">
+                <a:spLocks noRot="1" noChangeAspect="1" noMove="1" noResize="1" noEditPoints="1" noAdjustHandles="1" noChangeArrowheads="1" noChangeShapeType="1" noTextEdit="1"/>
+              </p:cNvSpPr>
+              <p:nvPr/>
+            </p:nvSpPr>
+            <p:spPr>
+              <a:xfrm>
+                <a:off x="3214441" y="5632180"/>
+                <a:ext cx="2057632" cy="369332"/>
+              </a:xfrm>
+              <a:prstGeom prst="rect">
+                <a:avLst/>
+              </a:prstGeom>
+              <a:blipFill>
+                <a:blip r:embed="rId16"/>
                 <a:stretch>
                   <a:fillRect/>
                 </a:stretch>
@@ -19033,7 +19687,7 @@
                             </p:stCondLst>
                             <p:childTnLst>
                               <p:par>
-                                <p:cTn id="5" presetID="1" presetClass="entr" presetSubtype="0" fill="hold" nodeType="clickEffect">
+                                <p:cTn id="5" presetID="1" presetClass="entr" presetSubtype="0" fill="hold" grpId="0" nodeType="clickEffect">
                                   <p:stCondLst>
                                     <p:cond delay="0"/>
                                   </p:stCondLst>
@@ -19046,7 +19700,7 @@
                                           </p:stCondLst>
                                         </p:cTn>
                                         <p:tgtEl>
-                                          <p:spTgt spid="14"/>
+                                          <p:spTgt spid="17"/>
                                         </p:tgtEl>
                                         <p:attrNameLst>
                                           <p:attrName>style.visibility</p:attrName>
@@ -19091,7 +19745,7 @@
                                           </p:stCondLst>
                                         </p:cTn>
                                         <p:tgtEl>
-                                          <p:spTgt spid="16"/>
+                                          <p:spTgt spid="14"/>
                                         </p:tgtEl>
                                         <p:attrNameLst>
                                           <p:attrName>style.visibility</p:attrName>
@@ -19136,7 +19790,7 @@
                                           </p:stCondLst>
                                         </p:cTn>
                                         <p:tgtEl>
-                                          <p:spTgt spid="18"/>
+                                          <p:spTgt spid="16"/>
                                         </p:tgtEl>
                                         <p:attrNameLst>
                                           <p:attrName>style.visibility</p:attrName>
@@ -19181,7 +19835,7 @@
                                           </p:stCondLst>
                                         </p:cTn>
                                         <p:tgtEl>
-                                          <p:spTgt spid="20"/>
+                                          <p:spTgt spid="18"/>
                                         </p:tgtEl>
                                         <p:attrNameLst>
                                           <p:attrName>style.visibility</p:attrName>
@@ -19226,7 +19880,7 @@
                                           </p:stCondLst>
                                         </p:cTn>
                                         <p:tgtEl>
-                                          <p:spTgt spid="22"/>
+                                          <p:spTgt spid="20"/>
                                         </p:tgtEl>
                                         <p:attrNameLst>
                                           <p:attrName>style.visibility</p:attrName>
@@ -19271,7 +19925,7 @@
                                           </p:stCondLst>
                                         </p:cTn>
                                         <p:tgtEl>
-                                          <p:spTgt spid="24"/>
+                                          <p:spTgt spid="22"/>
                                         </p:tgtEl>
                                         <p:attrNameLst>
                                           <p:attrName>style.visibility</p:attrName>
@@ -19316,7 +19970,7 @@
                                           </p:stCondLst>
                                         </p:cTn>
                                         <p:tgtEl>
-                                          <p:spTgt spid="26"/>
+                                          <p:spTgt spid="24"/>
                                         </p:tgtEl>
                                         <p:attrNameLst>
                                           <p:attrName>style.visibility</p:attrName>
@@ -19356,6 +20010,51 @@
                                     <p:set>
                                       <p:cBhvr>
                                         <p:cTn id="34" dur="1" fill="hold">
+                                          <p:stCondLst>
+                                            <p:cond delay="0"/>
+                                          </p:stCondLst>
+                                        </p:cTn>
+                                        <p:tgtEl>
+                                          <p:spTgt spid="26"/>
+                                        </p:tgtEl>
+                                        <p:attrNameLst>
+                                          <p:attrName>style.visibility</p:attrName>
+                                        </p:attrNameLst>
+                                      </p:cBhvr>
+                                      <p:to>
+                                        <p:strVal val="visible"/>
+                                      </p:to>
+                                    </p:set>
+                                  </p:childTnLst>
+                                </p:cTn>
+                              </p:par>
+                            </p:childTnLst>
+                          </p:cTn>
+                        </p:par>
+                      </p:childTnLst>
+                    </p:cTn>
+                  </p:par>
+                  <p:par>
+                    <p:cTn id="35" fill="hold">
+                      <p:stCondLst>
+                        <p:cond delay="indefinite"/>
+                      </p:stCondLst>
+                      <p:childTnLst>
+                        <p:par>
+                          <p:cTn id="36" fill="hold">
+                            <p:stCondLst>
+                              <p:cond delay="0"/>
+                            </p:stCondLst>
+                            <p:childTnLst>
+                              <p:par>
+                                <p:cTn id="37" presetID="1" presetClass="entr" presetSubtype="0" fill="hold" nodeType="clickEffect">
+                                  <p:stCondLst>
+                                    <p:cond delay="0"/>
+                                  </p:stCondLst>
+                                  <p:childTnLst>
+                                    <p:set>
+                                      <p:cBhvr>
+                                        <p:cTn id="38" dur="1" fill="hold">
                                           <p:stCondLst>
                                             <p:cond delay="0"/>
                                           </p:stCondLst>
@@ -19401,6 +20100,9 @@
         </p:cTn>
       </p:par>
     </p:tnLst>
+    <p:bldLst>
+      <p:bldP spid="17" grpId="0"/>
+    </p:bldLst>
   </p:timing>
 </p:sld>
 </file>
@@ -19549,6 +20251,200 @@
           </a:p>
         </p:txBody>
       </p:sp>
+      <mc:AlternateContent xmlns:mc="http://schemas.openxmlformats.org/markup-compatibility/2006">
+        <mc:Choice xmlns:a14="http://schemas.microsoft.com/office/drawing/2010/main" Requires="a14">
+          <p:sp>
+            <p:nvSpPr>
+              <p:cNvPr id="6" name="TextBox 5">
+                <a:extLst>
+                  <a:ext uri="{FF2B5EF4-FFF2-40B4-BE49-F238E27FC236}">
+                    <a16:creationId xmlns:a16="http://schemas.microsoft.com/office/drawing/2014/main" id="{B8841353-5CD8-46B6-8307-877BB1BB0FBE}"/>
+                  </a:ext>
+                </a:extLst>
+              </p:cNvPr>
+              <p:cNvSpPr txBox="1"/>
+              <p:nvPr/>
+            </p:nvSpPr>
+            <p:spPr>
+              <a:xfrm>
+                <a:off x="6806852" y="4885432"/>
+                <a:ext cx="2471902" cy="369332"/>
+              </a:xfrm>
+              <a:prstGeom prst="rect">
+                <a:avLst/>
+              </a:prstGeom>
+              <a:noFill/>
+            </p:spPr>
+            <p:txBody>
+              <a:bodyPr wrap="square" rtlCol="0">
+                <a:spAutoFit/>
+              </a:bodyPr>
+              <a:lstStyle/>
+              <a:p>
+                <a:pPr/>
+                <a14:m>
+                  <m:oMathPara xmlns:m="http://schemas.openxmlformats.org/officeDocument/2006/math">
+                    <m:oMathParaPr>
+                      <m:jc m:val="left"/>
+                    </m:oMathParaPr>
+                    <m:oMath xmlns:m="http://schemas.openxmlformats.org/officeDocument/2006/math">
+                      <m:r>
+                        <a:rPr lang="en-GB" b="0" i="1" smtClean="0">
+                          <a:latin typeface="Cambria Math" panose="02040503050406030204" pitchFamily="18" charset="0"/>
+                        </a:rPr>
+                        <m:t>𝑀</m:t>
+                      </m:r>
+                      <m:d>
+                        <m:dPr>
+                          <m:ctrlPr>
+                            <a:rPr lang="en-GB" b="0" i="1" smtClean="0">
+                              <a:latin typeface="Cambria Math" panose="02040503050406030204" pitchFamily="18" charset="0"/>
+                            </a:rPr>
+                          </m:ctrlPr>
+                        </m:dPr>
+                        <m:e>
+                          <m:sSub>
+                            <m:sSubPr>
+                              <m:ctrlPr>
+                                <a:rPr lang="en-GB" b="0" i="1" smtClean="0">
+                                  <a:latin typeface="Cambria Math" panose="02040503050406030204" pitchFamily="18" charset="0"/>
+                                </a:rPr>
+                              </m:ctrlPr>
+                            </m:sSubPr>
+                            <m:e>
+                              <m:r>
+                                <a:rPr lang="en-GB" b="0" i="1" smtClean="0">
+                                  <a:latin typeface="Cambria Math" panose="02040503050406030204" pitchFamily="18" charset="0"/>
+                                </a:rPr>
+                                <m:t>𝑣</m:t>
+                              </m:r>
+                            </m:e>
+                            <m:sub>
+                              <m:r>
+                                <a:rPr lang="en-GB" b="0" i="1" smtClean="0">
+                                  <a:latin typeface="Cambria Math" panose="02040503050406030204" pitchFamily="18" charset="0"/>
+                                </a:rPr>
+                                <m:t>𝐴</m:t>
+                              </m:r>
+                            </m:sub>
+                          </m:sSub>
+                          <m:r>
+                            <a:rPr lang="en-GB" b="0" i="1" smtClean="0">
+                              <a:latin typeface="Cambria Math" panose="02040503050406030204" pitchFamily="18" charset="0"/>
+                            </a:rPr>
+                            <m:t>+</m:t>
+                          </m:r>
+                          <m:sSub>
+                            <m:sSubPr>
+                              <m:ctrlPr>
+                                <a:rPr lang="en-GB" b="0" i="1" smtClean="0">
+                                  <a:latin typeface="Cambria Math" panose="02040503050406030204" pitchFamily="18" charset="0"/>
+                                </a:rPr>
+                              </m:ctrlPr>
+                            </m:sSubPr>
+                            <m:e>
+                              <m:r>
+                                <a:rPr lang="en-GB" b="0" i="1" smtClean="0">
+                                  <a:latin typeface="Cambria Math" panose="02040503050406030204" pitchFamily="18" charset="0"/>
+                                </a:rPr>
+                                <m:t>𝑣</m:t>
+                              </m:r>
+                            </m:e>
+                            <m:sub>
+                              <m:r>
+                                <a:rPr lang="en-GB" b="0" i="1" smtClean="0">
+                                  <a:latin typeface="Cambria Math" panose="02040503050406030204" pitchFamily="18" charset="0"/>
+                                </a:rPr>
+                                <m:t>𝐵</m:t>
+                              </m:r>
+                            </m:sub>
+                          </m:sSub>
+                        </m:e>
+                      </m:d>
+                      <m:r>
+                        <a:rPr lang="en-GB" b="0" i="1" smtClean="0">
+                          <a:latin typeface="Cambria Math" panose="02040503050406030204" pitchFamily="18" charset="0"/>
+                        </a:rPr>
+                        <m:t>=</m:t>
+                      </m:r>
+                      <m:d>
+                        <m:dPr>
+                          <m:begChr m:val="{"/>
+                          <m:endChr m:val="}"/>
+                          <m:ctrlPr>
+                            <a:rPr lang="en-GB" b="0" i="1" smtClean="0">
+                              <a:latin typeface="Cambria Math" panose="02040503050406030204" pitchFamily="18" charset="0"/>
+                            </a:rPr>
+                          </m:ctrlPr>
+                        </m:dPr>
+                        <m:e>
+                          <m:r>
+                            <a:rPr lang="en-GB" b="0" i="1" smtClean="0">
+                              <a:latin typeface="Cambria Math" panose="02040503050406030204" pitchFamily="18" charset="0"/>
+                            </a:rPr>
+                            <m:t>1, 2, </m:t>
+                          </m:r>
+                          <m:r>
+                            <a:rPr lang="en-GB" b="0" i="1" smtClean="0">
+                              <a:latin typeface="Cambria Math" panose="02040503050406030204" pitchFamily="18" charset="0"/>
+                            </a:rPr>
+                            <m:t>2</m:t>
+                          </m:r>
+                        </m:e>
+                      </m:d>
+                    </m:oMath>
+                  </m:oMathPara>
+                </a14:m>
+                <a:endParaRPr lang="en-GB" dirty="0"/>
+              </a:p>
+            </p:txBody>
+          </p:sp>
+        </mc:Choice>
+        <mc:Fallback>
+          <p:sp>
+            <p:nvSpPr>
+              <p:cNvPr id="6" name="TextBox 5">
+                <a:extLst>
+                  <a:ext uri="{FF2B5EF4-FFF2-40B4-BE49-F238E27FC236}">
+                    <a16:creationId xmlns:a16="http://schemas.microsoft.com/office/drawing/2014/main" id="{B8841353-5CD8-46B6-8307-877BB1BB0FBE}"/>
+                  </a:ext>
+                </a:extLst>
+              </p:cNvPr>
+              <p:cNvSpPr txBox="1">
+                <a:spLocks noRot="1" noChangeAspect="1" noMove="1" noResize="1" noEditPoints="1" noAdjustHandles="1" noChangeArrowheads="1" noChangeShapeType="1" noTextEdit="1"/>
+              </p:cNvSpPr>
+              <p:nvPr/>
+            </p:nvSpPr>
+            <p:spPr>
+              <a:xfrm>
+                <a:off x="6806852" y="4885432"/>
+                <a:ext cx="2471902" cy="369332"/>
+              </a:xfrm>
+              <a:prstGeom prst="rect">
+                <a:avLst/>
+              </a:prstGeom>
+              <a:blipFill>
+                <a:blip r:embed="rId4"/>
+                <a:stretch>
+                  <a:fillRect/>
+                </a:stretch>
+              </a:blipFill>
+            </p:spPr>
+            <p:txBody>
+              <a:bodyPr/>
+              <a:lstStyle/>
+              <a:p>
+                <a:r>
+                  <a:rPr lang="en-GB">
+                    <a:noFill/>
+                  </a:rPr>
+                  <a:t> </a:t>
+                </a:r>
+              </a:p>
+            </p:txBody>
+          </p:sp>
+        </mc:Fallback>
+      </mc:AlternateContent>
     </p:spTree>
     <p:extLst>
       <p:ext uri="{BB962C8B-B14F-4D97-AF65-F5344CB8AC3E}">
@@ -20288,8 +21184,8 @@
           </a:p>
         </p:txBody>
       </p:sp>
-      <mc:AlternateContent xmlns:mc="http://schemas.openxmlformats.org/markup-compatibility/2006">
-        <mc:Choice xmlns:a14="http://schemas.microsoft.com/office/drawing/2010/main" Requires="a14">
+      <mc:AlternateContent xmlns:mc="http://schemas.openxmlformats.org/markup-compatibility/2006" xmlns:a14="http://schemas.microsoft.com/office/drawing/2010/main">
+        <mc:Choice Requires="a14">
           <p:sp>
             <p:nvSpPr>
               <p:cNvPr id="3" name="Content Placeholder 2">
@@ -20529,7 +21425,7 @@
             </p:txBody>
           </p:sp>
         </mc:Choice>
-        <mc:Fallback>
+        <mc:Fallback xmlns="">
           <p:sp>
             <p:nvSpPr>
               <p:cNvPr id="3" name="Content Placeholder 2">

</xml_diff>